<commit_message>
updated requirements based on the presentation feedback
</commit_message>
<xml_diff>
--- a/requirements/CS 372 Requirements Presentation.pptx
+++ b/requirements/CS 372 Requirements Presentation.pptx
@@ -15,25 +15,27 @@
     <p:sldId id="260" r:id="rId10"/>
     <p:sldId id="261" r:id="rId11"/>
     <p:sldId id="262" r:id="rId12"/>
+    <p:sldId id="263" r:id="rId13"/>
+    <p:sldId id="264" r:id="rId14"/>
   </p:sldIdLst>
   <p:sldSz cy="5143500" cx="9144000"/>
   <p:notesSz cx="6858000" cy="9144000"/>
   <p:embeddedFontLst>
     <p:embeddedFont>
       <p:font typeface="Source Code Pro"/>
-      <p:regular r:id="rId13"/>
-      <p:bold r:id="rId14"/>
-      <p:italic r:id="rId15"/>
-      <p:boldItalic r:id="rId16"/>
+      <p:regular r:id="rId15"/>
+      <p:bold r:id="rId16"/>
+      <p:italic r:id="rId17"/>
+      <p:boldItalic r:id="rId18"/>
     </p:embeddedFont>
     <p:embeddedFont>
       <p:font typeface="Average"/>
-      <p:regular r:id="rId17"/>
+      <p:regular r:id="rId19"/>
     </p:embeddedFont>
     <p:embeddedFont>
       <p:font typeface="Oswald"/>
-      <p:regular r:id="rId18"/>
-      <p:bold r:id="rId19"/>
+      <p:regular r:id="rId20"/>
+      <p:bold r:id="rId21"/>
     </p:embeddedFont>
   </p:embeddedFontLst>
   <p:defaultTextStyle>
@@ -913,7 +915,7 @@
   <p:cSld>
     <p:spTree>
       <p:nvGrpSpPr>
-        <p:cNvPr id="77" name="Shape 77"/>
+        <p:cNvPr id="81" name="Shape 81"/>
         <p:cNvGrpSpPr/>
         <p:nvPr/>
       </p:nvGrpSpPr>
@@ -927,7 +929,7 @@
       </p:grpSpPr>
       <p:sp>
         <p:nvSpPr>
-          <p:cNvPr id="78" name="Google Shape;78;g27e06adef76_0_35:notes"/>
+          <p:cNvPr id="82" name="Google Shape;82;g27e06adef76_0_35:notes"/>
           <p:cNvSpPr/>
           <p:nvPr>
             <p:ph idx="2" type="sldImg"/>
@@ -962,7 +964,7 @@
       </p:sp>
       <p:sp>
         <p:nvSpPr>
-          <p:cNvPr id="79" name="Google Shape;79;g27e06adef76_0_35:notes"/>
+          <p:cNvPr id="83" name="Google Shape;83;g27e06adef76_0_35:notes"/>
           <p:cNvSpPr txBox="1"/>
           <p:nvPr>
             <p:ph idx="1" type="body"/>
@@ -1012,7 +1014,7 @@
   <p:cSld>
     <p:spTree>
       <p:nvGrpSpPr>
-        <p:cNvPr id="94" name="Shape 94"/>
+        <p:cNvPr id="103" name="Shape 103"/>
         <p:cNvGrpSpPr/>
         <p:nvPr/>
       </p:nvGrpSpPr>
@@ -1026,7 +1028,7 @@
       </p:grpSpPr>
       <p:sp>
         <p:nvSpPr>
-          <p:cNvPr id="95" name="Google Shape;95;g27e06adef76_0_40:notes"/>
+          <p:cNvPr id="104" name="Google Shape;104;g28027559495_1_61:notes"/>
           <p:cNvSpPr/>
           <p:nvPr>
             <p:ph idx="2" type="sldImg"/>
@@ -1061,7 +1063,7 @@
       </p:sp>
       <p:sp>
         <p:nvSpPr>
-          <p:cNvPr id="96" name="Google Shape;96;g27e06adef76_0_40:notes"/>
+          <p:cNvPr id="105" name="Google Shape;105;g28027559495_1_61:notes"/>
           <p:cNvSpPr txBox="1"/>
           <p:nvPr>
             <p:ph idx="1" type="body"/>
@@ -1111,7 +1113,7 @@
   <p:cSld>
     <p:spTree>
       <p:nvGrpSpPr>
-        <p:cNvPr id="100" name="Shape 100"/>
+        <p:cNvPr id="109" name="Shape 109"/>
         <p:cNvGrpSpPr/>
         <p:nvPr/>
       </p:nvGrpSpPr>
@@ -1125,7 +1127,7 @@
       </p:grpSpPr>
       <p:sp>
         <p:nvSpPr>
-          <p:cNvPr id="101" name="Google Shape;101;g27e06adef76_0_45:notes"/>
+          <p:cNvPr id="110" name="Google Shape;110;g27e06adef76_0_40:notes"/>
           <p:cNvSpPr/>
           <p:nvPr>
             <p:ph idx="2" type="sldImg"/>
@@ -1160,7 +1162,7 @@
       </p:sp>
       <p:sp>
         <p:nvSpPr>
-          <p:cNvPr id="102" name="Google Shape;102;g27e06adef76_0_45:notes"/>
+          <p:cNvPr id="111" name="Google Shape;111;g27e06adef76_0_40:notes"/>
           <p:cNvSpPr txBox="1"/>
           <p:nvPr>
             <p:ph idx="1" type="body"/>
@@ -1210,7 +1212,7 @@
   <p:cSld>
     <p:spTree>
       <p:nvGrpSpPr>
-        <p:cNvPr id="106" name="Shape 106"/>
+        <p:cNvPr id="115" name="Shape 115"/>
         <p:cNvGrpSpPr/>
         <p:nvPr/>
       </p:nvGrpSpPr>
@@ -1224,7 +1226,7 @@
       </p:grpSpPr>
       <p:sp>
         <p:nvSpPr>
-          <p:cNvPr id="107" name="Google Shape;107;g27e06adef76_0_50:notes"/>
+          <p:cNvPr id="116" name="Google Shape;116;g27e06adef76_0_45:notes"/>
           <p:cNvSpPr/>
           <p:nvPr>
             <p:ph idx="2" type="sldImg"/>
@@ -1259,7 +1261,7 @@
       </p:sp>
       <p:sp>
         <p:nvSpPr>
-          <p:cNvPr id="108" name="Google Shape;108;g27e06adef76_0_50:notes"/>
+          <p:cNvPr id="117" name="Google Shape;117;g27e06adef76_0_45:notes"/>
           <p:cNvSpPr txBox="1"/>
           <p:nvPr>
             <p:ph idx="1" type="body"/>
@@ -1309,7 +1311,7 @@
   <p:cSld>
     <p:spTree>
       <p:nvGrpSpPr>
-        <p:cNvPr id="112" name="Shape 112"/>
+        <p:cNvPr id="121" name="Shape 121"/>
         <p:cNvGrpSpPr/>
         <p:nvPr/>
       </p:nvGrpSpPr>
@@ -1323,7 +1325,7 @@
       </p:grpSpPr>
       <p:sp>
         <p:nvSpPr>
-          <p:cNvPr id="113" name="Google Shape;113;g27e06adef76_0_55:notes"/>
+          <p:cNvPr id="122" name="Google Shape;122;g28027559495_1_86:notes"/>
           <p:cNvSpPr/>
           <p:nvPr>
             <p:ph idx="2" type="sldImg"/>
@@ -1358,7 +1360,205 @@
       </p:sp>
       <p:sp>
         <p:nvSpPr>
-          <p:cNvPr id="114" name="Google Shape;114;g27e06adef76_0_55:notes"/>
+          <p:cNvPr id="123" name="Google Shape;123;g28027559495_1_86:notes"/>
+          <p:cNvSpPr txBox="1"/>
+          <p:nvPr>
+            <p:ph idx="1" type="body"/>
+          </p:nvPr>
+        </p:nvSpPr>
+        <p:spPr>
+          <a:xfrm>
+            <a:off x="685800" y="4343400"/>
+            <a:ext cx="5486400" cy="4114800"/>
+          </a:xfrm>
+          <a:prstGeom prst="rect">
+            <a:avLst/>
+          </a:prstGeom>
+        </p:spPr>
+        <p:txBody>
+          <a:bodyPr anchorCtr="0" anchor="t" bIns="91425" lIns="91425" spcFirstLastPara="1" rIns="91425" wrap="square" tIns="91425">
+            <a:noAutofit/>
+          </a:bodyPr>
+          <a:lstStyle/>
+          <a:p>
+            <a:pPr indent="0" lvl="0" marL="0" rtl="0" algn="l">
+              <a:spcBef>
+                <a:spcPts val="0"/>
+              </a:spcBef>
+              <a:spcAft>
+                <a:spcPts val="0"/>
+              </a:spcAft>
+              <a:buNone/>
+            </a:pPr>
+            <a:r>
+              <a:t/>
+            </a:r>
+            <a:endParaRPr/>
+          </a:p>
+        </p:txBody>
+      </p:sp>
+    </p:spTree>
+  </p:cSld>
+  <p:clrMapOvr>
+    <a:masterClrMapping/>
+  </p:clrMapOvr>
+</p:notes>
+</file>
+
+<file path=ppt/notesSlides/notesSlide8.xml><?xml version="1.0" encoding="utf-8"?>
+<p:notes xmlns:a="http://schemas.openxmlformats.org/drawingml/2006/main" xmlns:r="http://schemas.openxmlformats.org/officeDocument/2006/relationships" xmlns:mc="http://schemas.openxmlformats.org/markup-compatibility/2006" xmlns:mv="urn:schemas-microsoft-com:mac:vml" xmlns:p="http://schemas.openxmlformats.org/presentationml/2006/main" xmlns:c="http://schemas.openxmlformats.org/drawingml/2006/chart" xmlns:dgm="http://schemas.openxmlformats.org/drawingml/2006/diagram" xmlns:o="urn:schemas-microsoft-com:office:office" xmlns:v="urn:schemas-microsoft-com:vml" xmlns:pvml="urn:schemas-microsoft-com:office:powerpoint" xmlns:com="http://schemas.openxmlformats.org/drawingml/2006/compatibility" xmlns:p14="http://schemas.microsoft.com/office/powerpoint/2010/main" xmlns:p15="http://schemas.microsoft.com/office/powerpoint/2012/main" xmlns:ahyp="http://schemas.microsoft.com/office/drawing/2018/hyperlinkcolor" showMasterPhAnim="0" showMasterSp="0">
+  <p:cSld>
+    <p:spTree>
+      <p:nvGrpSpPr>
+        <p:cNvPr id="127" name="Shape 127"/>
+        <p:cNvGrpSpPr/>
+        <p:nvPr/>
+      </p:nvGrpSpPr>
+      <p:grpSpPr>
+        <a:xfrm>
+          <a:off x="0" y="0"/>
+          <a:ext cx="0" cy="0"/>
+          <a:chOff x="0" y="0"/>
+          <a:chExt cx="0" cy="0"/>
+        </a:xfrm>
+      </p:grpSpPr>
+      <p:sp>
+        <p:nvSpPr>
+          <p:cNvPr id="128" name="Google Shape;128;g27e06adef76_0_50:notes"/>
+          <p:cNvSpPr/>
+          <p:nvPr>
+            <p:ph idx="2" type="sldImg"/>
+          </p:nvPr>
+        </p:nvSpPr>
+        <p:spPr>
+          <a:xfrm>
+            <a:off x="381300" y="685800"/>
+            <a:ext cx="6096000" cy="3429000"/>
+          </a:xfrm>
+          <a:custGeom>
+            <a:rect b="b" l="l" r="r" t="t"/>
+            <a:pathLst>
+              <a:path extrusionOk="0" h="120000" w="120000">
+                <a:moveTo>
+                  <a:pt x="0" y="0"/>
+                </a:moveTo>
+                <a:lnTo>
+                  <a:pt x="120000" y="0"/>
+                </a:lnTo>
+                <a:lnTo>
+                  <a:pt x="120000" y="120000"/>
+                </a:lnTo>
+                <a:lnTo>
+                  <a:pt x="0" y="120000"/>
+                </a:lnTo>
+                <a:close/>
+              </a:path>
+            </a:pathLst>
+          </a:custGeom>
+        </p:spPr>
+      </p:sp>
+      <p:sp>
+        <p:nvSpPr>
+          <p:cNvPr id="129" name="Google Shape;129;g27e06adef76_0_50:notes"/>
+          <p:cNvSpPr txBox="1"/>
+          <p:nvPr>
+            <p:ph idx="1" type="body"/>
+          </p:nvPr>
+        </p:nvSpPr>
+        <p:spPr>
+          <a:xfrm>
+            <a:off x="685800" y="4343400"/>
+            <a:ext cx="5486400" cy="4114800"/>
+          </a:xfrm>
+          <a:prstGeom prst="rect">
+            <a:avLst/>
+          </a:prstGeom>
+        </p:spPr>
+        <p:txBody>
+          <a:bodyPr anchorCtr="0" anchor="t" bIns="91425" lIns="91425" spcFirstLastPara="1" rIns="91425" wrap="square" tIns="91425">
+            <a:noAutofit/>
+          </a:bodyPr>
+          <a:lstStyle/>
+          <a:p>
+            <a:pPr indent="0" lvl="0" marL="0" rtl="0" algn="l">
+              <a:spcBef>
+                <a:spcPts val="0"/>
+              </a:spcBef>
+              <a:spcAft>
+                <a:spcPts val="0"/>
+              </a:spcAft>
+              <a:buNone/>
+            </a:pPr>
+            <a:r>
+              <a:t/>
+            </a:r>
+            <a:endParaRPr/>
+          </a:p>
+        </p:txBody>
+      </p:sp>
+    </p:spTree>
+  </p:cSld>
+  <p:clrMapOvr>
+    <a:masterClrMapping/>
+  </p:clrMapOvr>
+</p:notes>
+</file>
+
+<file path=ppt/notesSlides/notesSlide9.xml><?xml version="1.0" encoding="utf-8"?>
+<p:notes xmlns:a="http://schemas.openxmlformats.org/drawingml/2006/main" xmlns:r="http://schemas.openxmlformats.org/officeDocument/2006/relationships" xmlns:mc="http://schemas.openxmlformats.org/markup-compatibility/2006" xmlns:mv="urn:schemas-microsoft-com:mac:vml" xmlns:p="http://schemas.openxmlformats.org/presentationml/2006/main" xmlns:c="http://schemas.openxmlformats.org/drawingml/2006/chart" xmlns:dgm="http://schemas.openxmlformats.org/drawingml/2006/diagram" xmlns:o="urn:schemas-microsoft-com:office:office" xmlns:v="urn:schemas-microsoft-com:vml" xmlns:pvml="urn:schemas-microsoft-com:office:powerpoint" xmlns:com="http://schemas.openxmlformats.org/drawingml/2006/compatibility" xmlns:p14="http://schemas.microsoft.com/office/powerpoint/2010/main" xmlns:p15="http://schemas.microsoft.com/office/powerpoint/2012/main" xmlns:ahyp="http://schemas.microsoft.com/office/drawing/2018/hyperlinkcolor" showMasterPhAnim="0" showMasterSp="0">
+  <p:cSld>
+    <p:spTree>
+      <p:nvGrpSpPr>
+        <p:cNvPr id="133" name="Shape 133"/>
+        <p:cNvGrpSpPr/>
+        <p:nvPr/>
+      </p:nvGrpSpPr>
+      <p:grpSpPr>
+        <a:xfrm>
+          <a:off x="0" y="0"/>
+          <a:ext cx="0" cy="0"/>
+          <a:chOff x="0" y="0"/>
+          <a:chExt cx="0" cy="0"/>
+        </a:xfrm>
+      </p:grpSpPr>
+      <p:sp>
+        <p:nvSpPr>
+          <p:cNvPr id="134" name="Google Shape;134;g27e06adef76_0_55:notes"/>
+          <p:cNvSpPr/>
+          <p:nvPr>
+            <p:ph idx="2" type="sldImg"/>
+          </p:nvPr>
+        </p:nvSpPr>
+        <p:spPr>
+          <a:xfrm>
+            <a:off x="381300" y="685800"/>
+            <a:ext cx="6096000" cy="3429000"/>
+          </a:xfrm>
+          <a:custGeom>
+            <a:rect b="b" l="l" r="r" t="t"/>
+            <a:pathLst>
+              <a:path extrusionOk="0" h="120000" w="120000">
+                <a:moveTo>
+                  <a:pt x="0" y="0"/>
+                </a:moveTo>
+                <a:lnTo>
+                  <a:pt x="120000" y="0"/>
+                </a:lnTo>
+                <a:lnTo>
+                  <a:pt x="120000" y="120000"/>
+                </a:lnTo>
+                <a:lnTo>
+                  <a:pt x="0" y="120000"/>
+                </a:lnTo>
+                <a:close/>
+              </a:path>
+            </a:pathLst>
+          </a:custGeom>
+        </p:spPr>
+      </p:sp>
+      <p:sp>
+        <p:nvSpPr>
+          <p:cNvPr id="135" name="Google Shape;135;g27e06adef76_0_55:notes"/>
           <p:cNvSpPr txBox="1"/>
           <p:nvPr>
             <p:ph idx="1" type="body"/>
@@ -6801,7 +7001,7 @@
         <p:spPr>
           <a:xfrm>
             <a:off x="311700" y="929050"/>
-            <a:ext cx="8520600" cy="3697200"/>
+            <a:ext cx="5415600" cy="3697200"/>
           </a:xfrm>
           <a:prstGeom prst="rect">
             <a:avLst/>
@@ -6809,7 +7009,7 @@
         </p:spPr>
         <p:txBody>
           <a:bodyPr anchorCtr="0" anchor="t" bIns="91425" lIns="91425" spcFirstLastPara="1" rIns="91425" wrap="square" tIns="91425">
-            <a:normAutofit/>
+            <a:normAutofit lnSpcReduction="20000"/>
           </a:bodyPr>
           <a:lstStyle/>
           <a:p>
@@ -6896,6 +7096,23 @@
             <a:r>
               <a:rPr lang="en"/>
               <a:t>NodeJS</a:t>
+            </a:r>
+            <a:endParaRPr/>
+          </a:p>
+          <a:p>
+            <a:pPr indent="-317500" lvl="1" marL="914400" rtl="0" algn="l">
+              <a:spcBef>
+                <a:spcPts val="0"/>
+              </a:spcBef>
+              <a:spcAft>
+                <a:spcPts val="0"/>
+              </a:spcAft>
+              <a:buSzPts val="1400"/>
+              <a:buChar char="○"/>
+            </a:pPr>
+            <a:r>
+              <a:rPr lang="en"/>
+              <a:t>Displays saved pages for logged-in users</a:t>
             </a:r>
             <a:endParaRPr/>
           </a:p>
@@ -7036,7 +7253,7 @@
         </p:nvSpPr>
         <p:spPr>
           <a:xfrm>
-            <a:off x="6351014" y="2109326"/>
+            <a:off x="6351014" y="1954351"/>
             <a:ext cx="1717800" cy="116400"/>
           </a:xfrm>
           <a:prstGeom prst="roundRect">
@@ -7569,6 +7786,228 @@
           </a:p>
         </p:txBody>
       </p:sp>
+      <p:sp>
+        <p:nvSpPr>
+          <p:cNvPr id="77" name="Google Shape;77;p14"/>
+          <p:cNvSpPr/>
+          <p:nvPr/>
+        </p:nvSpPr>
+        <p:spPr>
+          <a:xfrm>
+            <a:off x="6483850" y="2321853"/>
+            <a:ext cx="329400" cy="499800"/>
+          </a:xfrm>
+          <a:prstGeom prst="rect">
+            <a:avLst/>
+          </a:prstGeom>
+          <a:solidFill>
+            <a:srgbClr val="FFFFFF"/>
+          </a:solidFill>
+          <a:ln cap="flat" cmpd="sng" w="9525">
+            <a:solidFill>
+              <a:srgbClr val="2D323C"/>
+            </a:solidFill>
+            <a:prstDash val="solid"/>
+            <a:round/>
+            <a:headEnd len="sm" w="sm" type="none"/>
+            <a:tailEnd len="sm" w="sm" type="none"/>
+          </a:ln>
+        </p:spPr>
+        <p:txBody>
+          <a:bodyPr anchorCtr="0" anchor="ctr" bIns="91425" lIns="91425" spcFirstLastPara="1" rIns="91425" wrap="square" tIns="91425">
+            <a:noAutofit/>
+          </a:bodyPr>
+          <a:lstStyle/>
+          <a:p>
+            <a:pPr indent="0" lvl="0" marL="0" rtl="0" algn="ctr">
+              <a:spcBef>
+                <a:spcPts val="0"/>
+              </a:spcBef>
+              <a:spcAft>
+                <a:spcPts val="0"/>
+              </a:spcAft>
+              <a:buNone/>
+            </a:pPr>
+            <a:r>
+              <a:t/>
+            </a:r>
+            <a:endParaRPr>
+              <a:latin typeface="Source Code Pro"/>
+              <a:ea typeface="Source Code Pro"/>
+              <a:cs typeface="Source Code Pro"/>
+              <a:sym typeface="Source Code Pro"/>
+            </a:endParaRPr>
+          </a:p>
+        </p:txBody>
+      </p:sp>
+      <p:sp>
+        <p:nvSpPr>
+          <p:cNvPr id="78" name="Google Shape;78;p14"/>
+          <p:cNvSpPr/>
+          <p:nvPr/>
+        </p:nvSpPr>
+        <p:spPr>
+          <a:xfrm>
+            <a:off x="6902950" y="2321853"/>
+            <a:ext cx="329400" cy="499800"/>
+          </a:xfrm>
+          <a:prstGeom prst="rect">
+            <a:avLst/>
+          </a:prstGeom>
+          <a:solidFill>
+            <a:srgbClr val="FFFFFF"/>
+          </a:solidFill>
+          <a:ln cap="flat" cmpd="sng" w="9525">
+            <a:solidFill>
+              <a:srgbClr val="2D323C"/>
+            </a:solidFill>
+            <a:prstDash val="solid"/>
+            <a:round/>
+            <a:headEnd len="sm" w="sm" type="none"/>
+            <a:tailEnd len="sm" w="sm" type="none"/>
+          </a:ln>
+        </p:spPr>
+        <p:txBody>
+          <a:bodyPr anchorCtr="0" anchor="ctr" bIns="91425" lIns="91425" spcFirstLastPara="1" rIns="91425" wrap="square" tIns="91425">
+            <a:noAutofit/>
+          </a:bodyPr>
+          <a:lstStyle/>
+          <a:p>
+            <a:pPr indent="0" lvl="0" marL="0" rtl="0" algn="ctr">
+              <a:spcBef>
+                <a:spcPts val="0"/>
+              </a:spcBef>
+              <a:spcAft>
+                <a:spcPts val="0"/>
+              </a:spcAft>
+              <a:buNone/>
+            </a:pPr>
+            <a:r>
+              <a:t/>
+            </a:r>
+            <a:endParaRPr>
+              <a:latin typeface="Source Code Pro"/>
+              <a:ea typeface="Source Code Pro"/>
+              <a:cs typeface="Source Code Pro"/>
+              <a:sym typeface="Source Code Pro"/>
+            </a:endParaRPr>
+          </a:p>
+        </p:txBody>
+      </p:sp>
+      <p:sp>
+        <p:nvSpPr>
+          <p:cNvPr id="79" name="Google Shape;79;p14"/>
+          <p:cNvSpPr/>
+          <p:nvPr/>
+        </p:nvSpPr>
+        <p:spPr>
+          <a:xfrm>
+            <a:off x="7322050" y="2321853"/>
+            <a:ext cx="329400" cy="499800"/>
+          </a:xfrm>
+          <a:prstGeom prst="rect">
+            <a:avLst/>
+          </a:prstGeom>
+          <a:solidFill>
+            <a:srgbClr val="FFFFFF"/>
+          </a:solidFill>
+          <a:ln cap="flat" cmpd="sng" w="9525">
+            <a:solidFill>
+              <a:srgbClr val="2D323C"/>
+            </a:solidFill>
+            <a:prstDash val="solid"/>
+            <a:round/>
+            <a:headEnd len="sm" w="sm" type="none"/>
+            <a:tailEnd len="sm" w="sm" type="none"/>
+          </a:ln>
+        </p:spPr>
+        <p:txBody>
+          <a:bodyPr anchorCtr="0" anchor="ctr" bIns="91425" lIns="91425" spcFirstLastPara="1" rIns="91425" wrap="square" tIns="91425">
+            <a:noAutofit/>
+          </a:bodyPr>
+          <a:lstStyle/>
+          <a:p>
+            <a:pPr indent="0" lvl="0" marL="0" rtl="0" algn="ctr">
+              <a:spcBef>
+                <a:spcPts val="0"/>
+              </a:spcBef>
+              <a:spcAft>
+                <a:spcPts val="0"/>
+              </a:spcAft>
+              <a:buNone/>
+            </a:pPr>
+            <a:r>
+              <a:t/>
+            </a:r>
+            <a:endParaRPr>
+              <a:latin typeface="Source Code Pro"/>
+              <a:ea typeface="Source Code Pro"/>
+              <a:cs typeface="Source Code Pro"/>
+              <a:sym typeface="Source Code Pro"/>
+            </a:endParaRPr>
+          </a:p>
+        </p:txBody>
+      </p:sp>
+      <p:sp>
+        <p:nvSpPr>
+          <p:cNvPr id="80" name="Google Shape;80;p14"/>
+          <p:cNvSpPr/>
+          <p:nvPr/>
+        </p:nvSpPr>
+        <p:spPr>
+          <a:xfrm>
+            <a:off x="6483850" y="2176925"/>
+            <a:ext cx="1403100" cy="73500"/>
+          </a:xfrm>
+          <a:prstGeom prst="rect">
+            <a:avLst/>
+          </a:prstGeom>
+          <a:solidFill>
+            <a:srgbClr val="FFFFFF"/>
+          </a:solidFill>
+          <a:ln cap="flat" cmpd="sng" w="9525">
+            <a:solidFill>
+              <a:srgbClr val="2D323C"/>
+            </a:solidFill>
+            <a:prstDash val="solid"/>
+            <a:round/>
+            <a:headEnd len="sm" w="sm" type="none"/>
+            <a:tailEnd len="sm" w="sm" type="none"/>
+          </a:ln>
+        </p:spPr>
+        <p:txBody>
+          <a:bodyPr anchorCtr="0" anchor="ctr" bIns="91425" lIns="91425" spcFirstLastPara="1" rIns="91425" wrap="square" tIns="91425">
+            <a:noAutofit/>
+          </a:bodyPr>
+          <a:lstStyle/>
+          <a:p>
+            <a:pPr indent="0" lvl="0" marL="0" rtl="0" algn="l">
+              <a:spcBef>
+                <a:spcPts val="0"/>
+              </a:spcBef>
+              <a:spcAft>
+                <a:spcPts val="0"/>
+              </a:spcAft>
+              <a:buNone/>
+            </a:pPr>
+            <a:r>
+              <a:rPr lang="en" sz="500">
+                <a:latin typeface="Source Code Pro"/>
+                <a:ea typeface="Source Code Pro"/>
+                <a:cs typeface="Source Code Pro"/>
+                <a:sym typeface="Source Code Pro"/>
+              </a:rPr>
+              <a:t>Watch Later</a:t>
+            </a:r>
+            <a:endParaRPr sz="500">
+              <a:latin typeface="Source Code Pro"/>
+              <a:ea typeface="Source Code Pro"/>
+              <a:cs typeface="Source Code Pro"/>
+              <a:sym typeface="Source Code Pro"/>
+            </a:endParaRPr>
+          </a:p>
+        </p:txBody>
+      </p:sp>
     </p:spTree>
   </p:cSld>
   <p:clrMapOvr>
@@ -7582,7 +8021,7 @@
   <p:cSld>
     <p:spTree>
       <p:nvGrpSpPr>
-        <p:cNvPr id="80" name="Shape 80"/>
+        <p:cNvPr id="84" name="Shape 84"/>
         <p:cNvGrpSpPr/>
         <p:nvPr/>
       </p:nvGrpSpPr>
@@ -7596,7 +8035,7 @@
       </p:grpSpPr>
       <p:sp>
         <p:nvSpPr>
-          <p:cNvPr id="81" name="Google Shape;81;p15"/>
+          <p:cNvPr id="85" name="Google Shape;85;p15"/>
           <p:cNvSpPr txBox="1"/>
           <p:nvPr>
             <p:ph type="title"/>
@@ -7636,7 +8075,7 @@
       </p:sp>
       <p:sp>
         <p:nvSpPr>
-          <p:cNvPr id="82" name="Google Shape;82;p15"/>
+          <p:cNvPr id="86" name="Google Shape;86;p15"/>
           <p:cNvSpPr txBox="1"/>
           <p:nvPr>
             <p:ph idx="1" type="body"/>
@@ -7653,7 +8092,7 @@
         </p:spPr>
         <p:txBody>
           <a:bodyPr anchorCtr="0" anchor="t" bIns="91425" lIns="91425" spcFirstLastPara="1" rIns="91425" wrap="square" tIns="91425">
-            <a:normAutofit/>
+            <a:normAutofit lnSpcReduction="20000"/>
           </a:bodyPr>
           <a:lstStyle/>
           <a:p>
@@ -7720,6 +8159,27 @@
             <a:r>
               <a:rPr lang="en"/>
               <a:t> media underneath like amazon’s “People who buy this also buy”</a:t>
+            </a:r>
+            <a:endParaRPr/>
+          </a:p>
+          <a:p>
+            <a:pPr indent="-342900" lvl="0" marL="457200" rtl="0" algn="l">
+              <a:spcBef>
+                <a:spcPts val="0"/>
+              </a:spcBef>
+              <a:spcAft>
+                <a:spcPts val="0"/>
+              </a:spcAft>
+              <a:buSzPts val="1800"/>
+              <a:buChar char="●"/>
+            </a:pPr>
+            <a:r>
+              <a:rPr lang="en"/>
+              <a:t>Logged-in users can “Like” a </a:t>
+            </a:r>
+            <a:r>
+              <a:rPr lang="en"/>
+              <a:t>recommendation</a:t>
             </a:r>
             <a:endParaRPr/>
           </a:p>
@@ -7727,7 +8187,7 @@
       </p:sp>
       <p:sp>
         <p:nvSpPr>
-          <p:cNvPr id="83" name="Google Shape;83;p15"/>
+          <p:cNvPr id="87" name="Google Shape;87;p15"/>
           <p:cNvSpPr/>
           <p:nvPr/>
         </p:nvSpPr>
@@ -7781,7 +8241,7 @@
       </p:sp>
       <p:sp>
         <p:nvSpPr>
-          <p:cNvPr id="84" name="Google Shape;84;p15"/>
+          <p:cNvPr id="88" name="Google Shape;88;p15"/>
           <p:cNvSpPr/>
           <p:nvPr/>
         </p:nvSpPr>
@@ -7841,7 +8301,7 @@
       </p:sp>
       <p:sp>
         <p:nvSpPr>
-          <p:cNvPr id="85" name="Google Shape;85;p15"/>
+          <p:cNvPr id="89" name="Google Shape;89;p15"/>
           <p:cNvSpPr/>
           <p:nvPr/>
         </p:nvSpPr>
@@ -7901,7 +8361,7 @@
       </p:sp>
       <p:sp>
         <p:nvSpPr>
-          <p:cNvPr id="86" name="Google Shape;86;p15"/>
+          <p:cNvPr id="90" name="Google Shape;90;p15"/>
           <p:cNvSpPr/>
           <p:nvPr/>
         </p:nvSpPr>
@@ -7955,7 +8415,7 @@
       </p:sp>
       <p:sp>
         <p:nvSpPr>
-          <p:cNvPr id="87" name="Google Shape;87;p15"/>
+          <p:cNvPr id="91" name="Google Shape;91;p15"/>
           <p:cNvSpPr/>
           <p:nvPr/>
         </p:nvSpPr>
@@ -8009,7 +8469,7 @@
       </p:sp>
       <p:sp>
         <p:nvSpPr>
-          <p:cNvPr id="88" name="Google Shape;88;p15"/>
+          <p:cNvPr id="92" name="Google Shape;92;p15"/>
           <p:cNvSpPr/>
           <p:nvPr/>
         </p:nvSpPr>
@@ -8063,7 +8523,7 @@
       </p:sp>
       <p:sp>
         <p:nvSpPr>
-          <p:cNvPr id="89" name="Google Shape;89;p15"/>
+          <p:cNvPr id="93" name="Google Shape;93;p15"/>
           <p:cNvSpPr/>
           <p:nvPr/>
         </p:nvSpPr>
@@ -8117,7 +8577,7 @@
       </p:sp>
       <p:sp>
         <p:nvSpPr>
-          <p:cNvPr id="90" name="Google Shape;90;p15"/>
+          <p:cNvPr id="94" name="Google Shape;94;p15"/>
           <p:cNvSpPr/>
           <p:nvPr/>
         </p:nvSpPr>
@@ -8171,7 +8631,7 @@
       </p:sp>
       <p:sp>
         <p:nvSpPr>
-          <p:cNvPr id="91" name="Google Shape;91;p15"/>
+          <p:cNvPr id="95" name="Google Shape;95;p15"/>
           <p:cNvSpPr/>
           <p:nvPr/>
         </p:nvSpPr>
@@ -8231,7 +8691,7 @@
       </p:sp>
       <p:sp>
         <p:nvSpPr>
-          <p:cNvPr id="92" name="Google Shape;92;p15"/>
+          <p:cNvPr id="96" name="Google Shape;96;p15"/>
           <p:cNvSpPr/>
           <p:nvPr/>
         </p:nvSpPr>
@@ -8285,7 +8745,7 @@
       </p:sp>
       <p:sp>
         <p:nvSpPr>
-          <p:cNvPr id="93" name="Google Shape;93;p15"/>
+          <p:cNvPr id="97" name="Google Shape;97;p15"/>
           <p:cNvSpPr/>
           <p:nvPr/>
         </p:nvSpPr>
@@ -8340,6 +8800,286 @@
           </a:p>
         </p:txBody>
       </p:sp>
+      <p:sp>
+        <p:nvSpPr>
+          <p:cNvPr id="98" name="Google Shape;98;p15"/>
+          <p:cNvSpPr/>
+          <p:nvPr/>
+        </p:nvSpPr>
+        <p:spPr>
+          <a:xfrm>
+            <a:off x="5045175" y="3041850"/>
+            <a:ext cx="123000" cy="116700"/>
+          </a:xfrm>
+          <a:prstGeom prst="star5">
+            <a:avLst>
+              <a:gd fmla="val 19098" name="adj"/>
+              <a:gd fmla="val 105146" name="hf"/>
+              <a:gd fmla="val 110557" name="vf"/>
+            </a:avLst>
+          </a:prstGeom>
+          <a:noFill/>
+          <a:ln cap="flat" cmpd="sng" w="9525">
+            <a:solidFill>
+              <a:schemeClr val="lt1"/>
+            </a:solidFill>
+            <a:prstDash val="solid"/>
+            <a:round/>
+            <a:headEnd len="sm" w="sm" type="none"/>
+            <a:tailEnd len="sm" w="sm" type="none"/>
+          </a:ln>
+        </p:spPr>
+        <p:txBody>
+          <a:bodyPr anchorCtr="0" anchor="ctr" bIns="91425" lIns="91425" spcFirstLastPara="1" rIns="91425" wrap="square" tIns="91425">
+            <a:noAutofit/>
+          </a:bodyPr>
+          <a:lstStyle/>
+          <a:p>
+            <a:pPr indent="0" lvl="0" marL="0" rtl="0" algn="ctr">
+              <a:spcBef>
+                <a:spcPts val="0"/>
+              </a:spcBef>
+              <a:spcAft>
+                <a:spcPts val="0"/>
+              </a:spcAft>
+              <a:buNone/>
+            </a:pPr>
+            <a:r>
+              <a:t/>
+            </a:r>
+            <a:endParaRPr>
+              <a:latin typeface="Average"/>
+              <a:ea typeface="Average"/>
+              <a:cs typeface="Average"/>
+              <a:sym typeface="Average"/>
+            </a:endParaRPr>
+          </a:p>
+        </p:txBody>
+      </p:sp>
+      <p:sp>
+        <p:nvSpPr>
+          <p:cNvPr id="99" name="Google Shape;99;p15"/>
+          <p:cNvSpPr/>
+          <p:nvPr/>
+        </p:nvSpPr>
+        <p:spPr>
+          <a:xfrm>
+            <a:off x="5669800" y="3041850"/>
+            <a:ext cx="123000" cy="116700"/>
+          </a:xfrm>
+          <a:prstGeom prst="star5">
+            <a:avLst>
+              <a:gd fmla="val 19098" name="adj"/>
+              <a:gd fmla="val 105146" name="hf"/>
+              <a:gd fmla="val 110557" name="vf"/>
+            </a:avLst>
+          </a:prstGeom>
+          <a:noFill/>
+          <a:ln cap="flat" cmpd="sng" w="9525">
+            <a:solidFill>
+              <a:schemeClr val="lt1"/>
+            </a:solidFill>
+            <a:prstDash val="solid"/>
+            <a:round/>
+            <a:headEnd len="sm" w="sm" type="none"/>
+            <a:tailEnd len="sm" w="sm" type="none"/>
+          </a:ln>
+        </p:spPr>
+        <p:txBody>
+          <a:bodyPr anchorCtr="0" anchor="ctr" bIns="91425" lIns="91425" spcFirstLastPara="1" rIns="91425" wrap="square" tIns="91425">
+            <a:noAutofit/>
+          </a:bodyPr>
+          <a:lstStyle/>
+          <a:p>
+            <a:pPr indent="0" lvl="0" marL="0" rtl="0" algn="ctr">
+              <a:spcBef>
+                <a:spcPts val="0"/>
+              </a:spcBef>
+              <a:spcAft>
+                <a:spcPts val="0"/>
+              </a:spcAft>
+              <a:buNone/>
+            </a:pPr>
+            <a:r>
+              <a:t/>
+            </a:r>
+            <a:endParaRPr>
+              <a:latin typeface="Average"/>
+              <a:ea typeface="Average"/>
+              <a:cs typeface="Average"/>
+              <a:sym typeface="Average"/>
+            </a:endParaRPr>
+          </a:p>
+        </p:txBody>
+      </p:sp>
+      <p:sp>
+        <p:nvSpPr>
+          <p:cNvPr id="100" name="Google Shape;100;p15"/>
+          <p:cNvSpPr/>
+          <p:nvPr/>
+        </p:nvSpPr>
+        <p:spPr>
+          <a:xfrm>
+            <a:off x="6318063" y="3041850"/>
+            <a:ext cx="123000" cy="116700"/>
+          </a:xfrm>
+          <a:prstGeom prst="star5">
+            <a:avLst>
+              <a:gd fmla="val 19098" name="adj"/>
+              <a:gd fmla="val 105146" name="hf"/>
+              <a:gd fmla="val 110557" name="vf"/>
+            </a:avLst>
+          </a:prstGeom>
+          <a:noFill/>
+          <a:ln cap="flat" cmpd="sng" w="9525">
+            <a:solidFill>
+              <a:schemeClr val="lt1"/>
+            </a:solidFill>
+            <a:prstDash val="solid"/>
+            <a:round/>
+            <a:headEnd len="sm" w="sm" type="none"/>
+            <a:tailEnd len="sm" w="sm" type="none"/>
+          </a:ln>
+        </p:spPr>
+        <p:txBody>
+          <a:bodyPr anchorCtr="0" anchor="ctr" bIns="91425" lIns="91425" spcFirstLastPara="1" rIns="91425" wrap="square" tIns="91425">
+            <a:noAutofit/>
+          </a:bodyPr>
+          <a:lstStyle/>
+          <a:p>
+            <a:pPr indent="0" lvl="0" marL="0" rtl="0" algn="ctr">
+              <a:spcBef>
+                <a:spcPts val="0"/>
+              </a:spcBef>
+              <a:spcAft>
+                <a:spcPts val="0"/>
+              </a:spcAft>
+              <a:buNone/>
+            </a:pPr>
+            <a:r>
+              <a:t/>
+            </a:r>
+            <a:endParaRPr>
+              <a:latin typeface="Average"/>
+              <a:ea typeface="Average"/>
+              <a:cs typeface="Average"/>
+              <a:sym typeface="Average"/>
+            </a:endParaRPr>
+          </a:p>
+        </p:txBody>
+      </p:sp>
+      <p:sp>
+        <p:nvSpPr>
+          <p:cNvPr id="101" name="Google Shape;101;p15"/>
+          <p:cNvSpPr/>
+          <p:nvPr/>
+        </p:nvSpPr>
+        <p:spPr>
+          <a:xfrm>
+            <a:off x="6966325" y="3041850"/>
+            <a:ext cx="123000" cy="116700"/>
+          </a:xfrm>
+          <a:prstGeom prst="star5">
+            <a:avLst>
+              <a:gd fmla="val 19098" name="adj"/>
+              <a:gd fmla="val 105146" name="hf"/>
+              <a:gd fmla="val 110557" name="vf"/>
+            </a:avLst>
+          </a:prstGeom>
+          <a:noFill/>
+          <a:ln cap="flat" cmpd="sng" w="9525">
+            <a:solidFill>
+              <a:schemeClr val="lt1"/>
+            </a:solidFill>
+            <a:prstDash val="solid"/>
+            <a:round/>
+            <a:headEnd len="sm" w="sm" type="none"/>
+            <a:tailEnd len="sm" w="sm" type="none"/>
+          </a:ln>
+        </p:spPr>
+        <p:txBody>
+          <a:bodyPr anchorCtr="0" anchor="ctr" bIns="91425" lIns="91425" spcFirstLastPara="1" rIns="91425" wrap="square" tIns="91425">
+            <a:noAutofit/>
+          </a:bodyPr>
+          <a:lstStyle/>
+          <a:p>
+            <a:pPr indent="0" lvl="0" marL="0" rtl="0" algn="ctr">
+              <a:spcBef>
+                <a:spcPts val="0"/>
+              </a:spcBef>
+              <a:spcAft>
+                <a:spcPts val="0"/>
+              </a:spcAft>
+              <a:buNone/>
+            </a:pPr>
+            <a:r>
+              <a:t/>
+            </a:r>
+            <a:endParaRPr>
+              <a:latin typeface="Average"/>
+              <a:ea typeface="Average"/>
+              <a:cs typeface="Average"/>
+              <a:sym typeface="Average"/>
+            </a:endParaRPr>
+          </a:p>
+        </p:txBody>
+      </p:sp>
+      <p:sp>
+        <p:nvSpPr>
+          <p:cNvPr id="102" name="Google Shape;102;p15"/>
+          <p:cNvSpPr/>
+          <p:nvPr/>
+        </p:nvSpPr>
+        <p:spPr>
+          <a:xfrm>
+            <a:off x="7614600" y="3041850"/>
+            <a:ext cx="123000" cy="116700"/>
+          </a:xfrm>
+          <a:prstGeom prst="star5">
+            <a:avLst>
+              <a:gd fmla="val 19098" name="adj"/>
+              <a:gd fmla="val 105146" name="hf"/>
+              <a:gd fmla="val 110557" name="vf"/>
+            </a:avLst>
+          </a:prstGeom>
+          <a:noFill/>
+          <a:ln cap="flat" cmpd="sng" w="9525">
+            <a:solidFill>
+              <a:schemeClr val="lt1"/>
+            </a:solidFill>
+            <a:prstDash val="solid"/>
+            <a:round/>
+            <a:headEnd len="sm" w="sm" type="none"/>
+            <a:tailEnd len="sm" w="sm" type="none"/>
+          </a:ln>
+        </p:spPr>
+        <p:txBody>
+          <a:bodyPr anchorCtr="0" anchor="ctr" bIns="91425" lIns="91425" spcFirstLastPara="1" rIns="91425" wrap="square" tIns="91425">
+            <a:noAutofit/>
+          </a:bodyPr>
+          <a:lstStyle/>
+          <a:p>
+            <a:pPr indent="0" lvl="0" marL="0" rtl="0" algn="ctr">
+              <a:spcBef>
+                <a:spcPts val="0"/>
+              </a:spcBef>
+              <a:spcAft>
+                <a:spcPts val="0"/>
+              </a:spcAft>
+              <a:buNone/>
+            </a:pPr>
+            <a:r>
+              <a:t/>
+            </a:r>
+            <a:endParaRPr>
+              <a:latin typeface="Average"/>
+              <a:ea typeface="Average"/>
+              <a:cs typeface="Average"/>
+              <a:sym typeface="Average"/>
+            </a:endParaRPr>
+          </a:p>
+        </p:txBody>
+      </p:sp>
     </p:spTree>
   </p:cSld>
   <p:clrMapOvr>
@@ -8353,7 +9093,7 @@
   <p:cSld>
     <p:spTree>
       <p:nvGrpSpPr>
-        <p:cNvPr id="97" name="Shape 97"/>
+        <p:cNvPr id="106" name="Shape 106"/>
         <p:cNvGrpSpPr/>
         <p:nvPr/>
       </p:nvGrpSpPr>
@@ -8367,7 +9107,7 @@
       </p:grpSpPr>
       <p:sp>
         <p:nvSpPr>
-          <p:cNvPr id="98" name="Google Shape;98;p16"/>
+          <p:cNvPr id="107" name="Google Shape;107;p16"/>
           <p:cNvSpPr txBox="1"/>
           <p:nvPr>
             <p:ph type="title"/>
@@ -8399,7 +9139,7 @@
             </a:pPr>
             <a:r>
               <a:rPr lang="en"/>
-              <a:t>MongoDB &amp; Normalization</a:t>
+              <a:t>Login and Save</a:t>
             </a:r>
             <a:endParaRPr/>
           </a:p>
@@ -8407,7 +9147,206 @@
       </p:sp>
       <p:sp>
         <p:nvSpPr>
-          <p:cNvPr id="99" name="Google Shape;99;p16"/>
+          <p:cNvPr id="108" name="Google Shape;108;p16"/>
+          <p:cNvSpPr txBox="1"/>
+          <p:nvPr>
+            <p:ph idx="1" type="body"/>
+          </p:nvPr>
+        </p:nvSpPr>
+        <p:spPr>
+          <a:xfrm>
+            <a:off x="311700" y="1152475"/>
+            <a:ext cx="8366700" cy="3416400"/>
+          </a:xfrm>
+          <a:prstGeom prst="rect">
+            <a:avLst/>
+          </a:prstGeom>
+        </p:spPr>
+        <p:txBody>
+          <a:bodyPr anchorCtr="0" anchor="t" bIns="91425" lIns="91425" spcFirstLastPara="1" rIns="91425" wrap="square" tIns="91425">
+            <a:normAutofit/>
+          </a:bodyPr>
+          <a:lstStyle/>
+          <a:p>
+            <a:pPr indent="-342900" lvl="0" marL="457200" rtl="0" algn="l">
+              <a:spcBef>
+                <a:spcPts val="0"/>
+              </a:spcBef>
+              <a:spcAft>
+                <a:spcPts val="0"/>
+              </a:spcAft>
+              <a:buSzPts val="1800"/>
+              <a:buChar char="●"/>
+            </a:pPr>
+            <a:r>
+              <a:rPr lang="en"/>
+              <a:t>Users can login via a simple login flow</a:t>
+            </a:r>
+            <a:endParaRPr/>
+          </a:p>
+          <a:p>
+            <a:pPr indent="-317500" lvl="1" marL="914400" rtl="0" algn="l">
+              <a:spcBef>
+                <a:spcPts val="0"/>
+              </a:spcBef>
+              <a:spcAft>
+                <a:spcPts val="0"/>
+              </a:spcAft>
+              <a:buSzPts val="1400"/>
+              <a:buChar char="○"/>
+            </a:pPr>
+            <a:r>
+              <a:rPr lang="en"/>
+              <a:t>Create user (username, password, confirm password)</a:t>
+            </a:r>
+            <a:endParaRPr/>
+          </a:p>
+          <a:p>
+            <a:pPr indent="-317500" lvl="1" marL="914400" rtl="0" algn="l">
+              <a:spcBef>
+                <a:spcPts val="0"/>
+              </a:spcBef>
+              <a:spcAft>
+                <a:spcPts val="0"/>
+              </a:spcAft>
+              <a:buSzPts val="1400"/>
+              <a:buChar char="○"/>
+            </a:pPr>
+            <a:r>
+              <a:rPr lang="en"/>
+              <a:t>Login (username, password)</a:t>
+            </a:r>
+            <a:endParaRPr/>
+          </a:p>
+          <a:p>
+            <a:pPr indent="-342900" lvl="0" marL="457200" rtl="0" algn="l">
+              <a:spcBef>
+                <a:spcPts val="0"/>
+              </a:spcBef>
+              <a:spcAft>
+                <a:spcPts val="0"/>
+              </a:spcAft>
+              <a:buSzPts val="1800"/>
+              <a:buChar char="●"/>
+            </a:pPr>
+            <a:r>
+              <a:rPr lang="en"/>
+              <a:t>A logged in user can</a:t>
+            </a:r>
+            <a:endParaRPr/>
+          </a:p>
+          <a:p>
+            <a:pPr indent="-317500" lvl="1" marL="914400" rtl="0" algn="l">
+              <a:spcBef>
+                <a:spcPts val="0"/>
+              </a:spcBef>
+              <a:spcAft>
+                <a:spcPts val="0"/>
+              </a:spcAft>
+              <a:buSzPts val="1400"/>
+              <a:buChar char="○"/>
+            </a:pPr>
+            <a:r>
+              <a:rPr lang="en"/>
+              <a:t>Save a media page, like a watch later</a:t>
+            </a:r>
+            <a:endParaRPr/>
+          </a:p>
+          <a:p>
+            <a:pPr indent="-317500" lvl="1" marL="914400" rtl="0" algn="l">
+              <a:spcBef>
+                <a:spcPts val="0"/>
+              </a:spcBef>
+              <a:spcAft>
+                <a:spcPts val="0"/>
+              </a:spcAft>
+              <a:buSzPts val="1400"/>
+              <a:buChar char="○"/>
+            </a:pPr>
+            <a:r>
+              <a:rPr lang="en"/>
+              <a:t>“Like” a </a:t>
+            </a:r>
+            <a:r>
+              <a:rPr lang="en"/>
+              <a:t>recommendation</a:t>
+            </a:r>
+            <a:r>
+              <a:rPr lang="en"/>
+              <a:t>, which ranks it higher for other users</a:t>
+            </a:r>
+            <a:endParaRPr/>
+          </a:p>
+        </p:txBody>
+      </p:sp>
+    </p:spTree>
+  </p:cSld>
+  <p:clrMapOvr>
+    <a:masterClrMapping/>
+  </p:clrMapOvr>
+</p:sld>
+</file>
+
+<file path=ppt/slides/slide5.xml><?xml version="1.0" encoding="utf-8"?>
+<p:sld xmlns:a="http://schemas.openxmlformats.org/drawingml/2006/main" xmlns:r="http://schemas.openxmlformats.org/officeDocument/2006/relationships" xmlns:mc="http://schemas.openxmlformats.org/markup-compatibility/2006" xmlns:mv="urn:schemas-microsoft-com:mac:vml" xmlns:p="http://schemas.openxmlformats.org/presentationml/2006/main" xmlns:c="http://schemas.openxmlformats.org/drawingml/2006/chart" xmlns:dgm="http://schemas.openxmlformats.org/drawingml/2006/diagram" xmlns:o="urn:schemas-microsoft-com:office:office" xmlns:v="urn:schemas-microsoft-com:vml" xmlns:pvml="urn:schemas-microsoft-com:office:powerpoint" xmlns:com="http://schemas.openxmlformats.org/drawingml/2006/compatibility" xmlns:p14="http://schemas.microsoft.com/office/powerpoint/2010/main" xmlns:p15="http://schemas.microsoft.com/office/powerpoint/2012/main" xmlns:ahyp="http://schemas.microsoft.com/office/drawing/2018/hyperlinkcolor">
+  <p:cSld>
+    <p:spTree>
+      <p:nvGrpSpPr>
+        <p:cNvPr id="112" name="Shape 112"/>
+        <p:cNvGrpSpPr/>
+        <p:nvPr/>
+      </p:nvGrpSpPr>
+      <p:grpSpPr>
+        <a:xfrm>
+          <a:off x="0" y="0"/>
+          <a:ext cx="0" cy="0"/>
+          <a:chOff x="0" y="0"/>
+          <a:chExt cx="0" cy="0"/>
+        </a:xfrm>
+      </p:grpSpPr>
+      <p:sp>
+        <p:nvSpPr>
+          <p:cNvPr id="113" name="Google Shape;113;p17"/>
+          <p:cNvSpPr txBox="1"/>
+          <p:nvPr>
+            <p:ph type="title"/>
+          </p:nvPr>
+        </p:nvSpPr>
+        <p:spPr>
+          <a:xfrm>
+            <a:off x="311700" y="445025"/>
+            <a:ext cx="8520600" cy="572700"/>
+          </a:xfrm>
+          <a:prstGeom prst="rect">
+            <a:avLst/>
+          </a:prstGeom>
+        </p:spPr>
+        <p:txBody>
+          <a:bodyPr anchorCtr="0" anchor="t" bIns="91425" lIns="91425" spcFirstLastPara="1" rIns="91425" wrap="square" tIns="91425">
+            <a:normAutofit fontScale="90000"/>
+          </a:bodyPr>
+          <a:lstStyle/>
+          <a:p>
+            <a:pPr indent="0" lvl="0" marL="0" rtl="0" algn="l">
+              <a:spcBef>
+                <a:spcPts val="0"/>
+              </a:spcBef>
+              <a:spcAft>
+                <a:spcPts val="0"/>
+              </a:spcAft>
+              <a:buNone/>
+            </a:pPr>
+            <a:r>
+              <a:rPr lang="en"/>
+              <a:t>MongoDB &amp; Normalization</a:t>
+            </a:r>
+            <a:endParaRPr/>
+          </a:p>
+        </p:txBody>
+      </p:sp>
+      <p:sp>
+        <p:nvSpPr>
+          <p:cNvPr id="114" name="Google Shape;114;p17"/>
           <p:cNvSpPr txBox="1"/>
           <p:nvPr>
             <p:ph idx="1" type="body"/>
@@ -8641,12 +9580,12 @@
 </p:sld>
 </file>
 
-<file path=ppt/slides/slide5.xml><?xml version="1.0" encoding="utf-8"?>
+<file path=ppt/slides/slide6.xml><?xml version="1.0" encoding="utf-8"?>
 <p:sld xmlns:a="http://schemas.openxmlformats.org/drawingml/2006/main" xmlns:r="http://schemas.openxmlformats.org/officeDocument/2006/relationships" xmlns:mc="http://schemas.openxmlformats.org/markup-compatibility/2006" xmlns:mv="urn:schemas-microsoft-com:mac:vml" xmlns:p="http://schemas.openxmlformats.org/presentationml/2006/main" xmlns:c="http://schemas.openxmlformats.org/drawingml/2006/chart" xmlns:dgm="http://schemas.openxmlformats.org/drawingml/2006/diagram" xmlns:o="urn:schemas-microsoft-com:office:office" xmlns:v="urn:schemas-microsoft-com:vml" xmlns:pvml="urn:schemas-microsoft-com:office:powerpoint" xmlns:com="http://schemas.openxmlformats.org/drawingml/2006/compatibility" xmlns:p14="http://schemas.microsoft.com/office/powerpoint/2010/main" xmlns:p15="http://schemas.microsoft.com/office/powerpoint/2012/main" xmlns:ahyp="http://schemas.microsoft.com/office/drawing/2018/hyperlinkcolor">
   <p:cSld>
     <p:spTree>
       <p:nvGrpSpPr>
-        <p:cNvPr id="103" name="Shape 103"/>
+        <p:cNvPr id="118" name="Shape 118"/>
         <p:cNvGrpSpPr/>
         <p:nvPr/>
       </p:nvGrpSpPr>
@@ -8660,7 +9599,7 @@
       </p:grpSpPr>
       <p:sp>
         <p:nvSpPr>
-          <p:cNvPr id="104" name="Google Shape;104;p17"/>
+          <p:cNvPr id="119" name="Google Shape;119;p18"/>
           <p:cNvSpPr txBox="1"/>
           <p:nvPr>
             <p:ph type="title"/>
@@ -8700,7 +9639,596 @@
       </p:sp>
       <p:sp>
         <p:nvSpPr>
-          <p:cNvPr id="105" name="Google Shape;105;p17"/>
+          <p:cNvPr id="120" name="Google Shape;120;p18"/>
+          <p:cNvSpPr txBox="1"/>
+          <p:nvPr>
+            <p:ph idx="1" type="body"/>
+          </p:nvPr>
+        </p:nvSpPr>
+        <p:spPr>
+          <a:xfrm>
+            <a:off x="311700" y="1152475"/>
+            <a:ext cx="8520600" cy="3802800"/>
+          </a:xfrm>
+          <a:prstGeom prst="rect">
+            <a:avLst/>
+          </a:prstGeom>
+        </p:spPr>
+        <p:txBody>
+          <a:bodyPr anchorCtr="0" anchor="t" bIns="91425" lIns="91425" spcFirstLastPara="1" rIns="91425" wrap="square" tIns="91425">
+            <a:normAutofit/>
+          </a:bodyPr>
+          <a:lstStyle/>
+          <a:p>
+            <a:pPr indent="0" lvl="0" marL="0" rtl="0" algn="l">
+              <a:spcBef>
+                <a:spcPts val="0"/>
+              </a:spcBef>
+              <a:spcAft>
+                <a:spcPts val="0"/>
+              </a:spcAft>
+              <a:buNone/>
+            </a:pPr>
+            <a:r>
+              <a:rPr lang="en" sz="1900"/>
+              <a:t>Provides JSON response to queries about specific searches and media</a:t>
+            </a:r>
+            <a:endParaRPr sz="1900"/>
+          </a:p>
+          <a:p>
+            <a:pPr indent="-349250" lvl="0" marL="457200" rtl="0" algn="l">
+              <a:spcBef>
+                <a:spcPts val="1200"/>
+              </a:spcBef>
+              <a:spcAft>
+                <a:spcPts val="0"/>
+              </a:spcAft>
+              <a:buSzPts val="1900"/>
+              <a:buChar char="-"/>
+            </a:pPr>
+            <a:r>
+              <a:rPr lang="en" sz="1900"/>
+              <a:t>“/search” endpoint</a:t>
+            </a:r>
+            <a:endParaRPr sz="1900"/>
+          </a:p>
+          <a:p>
+            <a:pPr indent="-323850" lvl="1" marL="914400" rtl="0" algn="l">
+              <a:spcBef>
+                <a:spcPts val="0"/>
+              </a:spcBef>
+              <a:spcAft>
+                <a:spcPts val="0"/>
+              </a:spcAft>
+              <a:buSzPts val="1500"/>
+              <a:buChar char="-"/>
+            </a:pPr>
+            <a:r>
+              <a:rPr lang="en" sz="1500"/>
+              <a:t>“?title=” returns results of media which case-insensitive </a:t>
+            </a:r>
+            <a:r>
+              <a:rPr lang="en" sz="1500"/>
+              <a:t>wildcard match the provided string</a:t>
+            </a:r>
+            <a:endParaRPr sz="1500"/>
+          </a:p>
+          <a:p>
+            <a:pPr indent="-323850" lvl="1" marL="914400" rtl="0" algn="l">
+              <a:spcBef>
+                <a:spcPts val="0"/>
+              </a:spcBef>
+              <a:spcAft>
+                <a:spcPts val="0"/>
+              </a:spcAft>
+              <a:buSzPts val="1500"/>
+              <a:buChar char="-"/>
+            </a:pPr>
+            <a:r>
+              <a:rPr lang="en" sz="1500"/>
+              <a:t>“?filters=” comma separated list of trope filters, which queries for the intersection of media associated with those tropes</a:t>
+            </a:r>
+            <a:endParaRPr sz="1500"/>
+          </a:p>
+          <a:p>
+            <a:pPr indent="-349250" lvl="0" marL="457200" rtl="0" algn="l">
+              <a:spcBef>
+                <a:spcPts val="0"/>
+              </a:spcBef>
+              <a:spcAft>
+                <a:spcPts val="0"/>
+              </a:spcAft>
+              <a:buSzPts val="1900"/>
+              <a:buChar char="-"/>
+            </a:pPr>
+            <a:r>
+              <a:rPr lang="en" sz="1900"/>
+              <a:t>“/recommendation” endpoint</a:t>
+            </a:r>
+            <a:endParaRPr sz="1900"/>
+          </a:p>
+          <a:p>
+            <a:pPr indent="-323850" lvl="1" marL="914400" rtl="0" algn="l">
+              <a:spcBef>
+                <a:spcPts val="0"/>
+              </a:spcBef>
+              <a:spcAft>
+                <a:spcPts val="0"/>
+              </a:spcAft>
+              <a:buSzPts val="1500"/>
+              <a:buChar char="-"/>
+            </a:pPr>
+            <a:r>
+              <a:rPr lang="en" sz="1500"/>
+              <a:t>“?id=” the unique key for the media record the user is querying</a:t>
+            </a:r>
+            <a:endParaRPr sz="1500"/>
+          </a:p>
+        </p:txBody>
+      </p:sp>
+    </p:spTree>
+  </p:cSld>
+  <p:clrMapOvr>
+    <a:masterClrMapping/>
+  </p:clrMapOvr>
+</p:sld>
+</file>
+
+<file path=ppt/slides/slide7.xml><?xml version="1.0" encoding="utf-8"?>
+<p:sld xmlns:a="http://schemas.openxmlformats.org/drawingml/2006/main" xmlns:r="http://schemas.openxmlformats.org/officeDocument/2006/relationships" xmlns:mc="http://schemas.openxmlformats.org/markup-compatibility/2006" xmlns:mv="urn:schemas-microsoft-com:mac:vml" xmlns:p="http://schemas.openxmlformats.org/presentationml/2006/main" xmlns:c="http://schemas.openxmlformats.org/drawingml/2006/chart" xmlns:dgm="http://schemas.openxmlformats.org/drawingml/2006/diagram" xmlns:o="urn:schemas-microsoft-com:office:office" xmlns:v="urn:schemas-microsoft-com:vml" xmlns:pvml="urn:schemas-microsoft-com:office:powerpoint" xmlns:com="http://schemas.openxmlformats.org/drawingml/2006/compatibility" xmlns:p14="http://schemas.microsoft.com/office/powerpoint/2010/main" xmlns:p15="http://schemas.microsoft.com/office/powerpoint/2012/main" xmlns:ahyp="http://schemas.microsoft.com/office/drawing/2018/hyperlinkcolor">
+  <p:cSld>
+    <p:spTree>
+      <p:nvGrpSpPr>
+        <p:cNvPr id="124" name="Shape 124"/>
+        <p:cNvGrpSpPr/>
+        <p:nvPr/>
+      </p:nvGrpSpPr>
+      <p:grpSpPr>
+        <a:xfrm>
+          <a:off x="0" y="0"/>
+          <a:ext cx="0" cy="0"/>
+          <a:chOff x="0" y="0"/>
+          <a:chExt cx="0" cy="0"/>
+        </a:xfrm>
+      </p:grpSpPr>
+      <p:sp>
+        <p:nvSpPr>
+          <p:cNvPr id="125" name="Google Shape;125;p19"/>
+          <p:cNvSpPr txBox="1"/>
+          <p:nvPr>
+            <p:ph type="title"/>
+          </p:nvPr>
+        </p:nvSpPr>
+        <p:spPr>
+          <a:xfrm>
+            <a:off x="311700" y="445025"/>
+            <a:ext cx="8520600" cy="572700"/>
+          </a:xfrm>
+          <a:prstGeom prst="rect">
+            <a:avLst/>
+          </a:prstGeom>
+        </p:spPr>
+        <p:txBody>
+          <a:bodyPr anchorCtr="0" anchor="t" bIns="91425" lIns="91425" spcFirstLastPara="1" rIns="91425" wrap="square" tIns="91425">
+            <a:normAutofit fontScale="90000"/>
+          </a:bodyPr>
+          <a:lstStyle/>
+          <a:p>
+            <a:pPr indent="0" lvl="0" marL="0" rtl="0" algn="l">
+              <a:spcBef>
+                <a:spcPts val="0"/>
+              </a:spcBef>
+              <a:spcAft>
+                <a:spcPts val="0"/>
+              </a:spcAft>
+              <a:buNone/>
+            </a:pPr>
+            <a:r>
+              <a:rPr lang="en"/>
+              <a:t>Server API Cont.</a:t>
+            </a:r>
+            <a:endParaRPr/>
+          </a:p>
+        </p:txBody>
+      </p:sp>
+      <p:sp>
+        <p:nvSpPr>
+          <p:cNvPr id="126" name="Google Shape;126;p19"/>
+          <p:cNvSpPr txBox="1"/>
+          <p:nvPr>
+            <p:ph idx="1" type="body"/>
+          </p:nvPr>
+        </p:nvSpPr>
+        <p:spPr>
+          <a:xfrm>
+            <a:off x="311700" y="1152475"/>
+            <a:ext cx="8520600" cy="3416400"/>
+          </a:xfrm>
+          <a:prstGeom prst="rect">
+            <a:avLst/>
+          </a:prstGeom>
+        </p:spPr>
+        <p:txBody>
+          <a:bodyPr anchorCtr="0" anchor="t" bIns="91425" lIns="91425" spcFirstLastPara="1" rIns="91425" wrap="square" tIns="91425">
+            <a:normAutofit fontScale="77500" lnSpcReduction="20000"/>
+          </a:bodyPr>
+          <a:lstStyle/>
+          <a:p>
+            <a:pPr indent="-322103" lvl="0" marL="457200" rtl="0" algn="l">
+              <a:spcBef>
+                <a:spcPts val="0"/>
+              </a:spcBef>
+              <a:spcAft>
+                <a:spcPts val="0"/>
+              </a:spcAft>
+              <a:buSzPct val="100000"/>
+              <a:buChar char="-"/>
+            </a:pPr>
+            <a:r>
+              <a:rPr lang="en" sz="1900"/>
+              <a:t>“/like” endpoint</a:t>
+            </a:r>
+            <a:endParaRPr sz="1900"/>
+          </a:p>
+          <a:p>
+            <a:pPr indent="-302418" lvl="1" marL="914400" rtl="0" algn="l">
+              <a:spcBef>
+                <a:spcPts val="0"/>
+              </a:spcBef>
+              <a:spcAft>
+                <a:spcPts val="0"/>
+              </a:spcAft>
+              <a:buSzPct val="100000"/>
+              <a:buChar char="-"/>
+            </a:pPr>
+            <a:r>
+              <a:rPr lang="en" sz="1500"/>
+              <a:t>PUT</a:t>
+            </a:r>
+            <a:endParaRPr sz="1500"/>
+          </a:p>
+          <a:p>
+            <a:pPr indent="-302418" lvl="2" marL="1371600" rtl="0" algn="l">
+              <a:spcBef>
+                <a:spcPts val="0"/>
+              </a:spcBef>
+              <a:spcAft>
+                <a:spcPts val="0"/>
+              </a:spcAft>
+              <a:buSzPct val="100000"/>
+              <a:buChar char="-"/>
+            </a:pPr>
+            <a:r>
+              <a:rPr lang="en" sz="1500"/>
+              <a:t>“?uid=” user that liked the media, ensures a user can only “like” the recommendation once</a:t>
+            </a:r>
+            <a:endParaRPr sz="1500"/>
+          </a:p>
+          <a:p>
+            <a:pPr indent="-302418" lvl="2" marL="1371600" rtl="0" algn="l">
+              <a:spcBef>
+                <a:spcPts val="0"/>
+              </a:spcBef>
+              <a:spcAft>
+                <a:spcPts val="0"/>
+              </a:spcAft>
+              <a:buSzPct val="100000"/>
+              <a:buChar char="-"/>
+            </a:pPr>
+            <a:r>
+              <a:rPr lang="en" sz="1500"/>
+              <a:t>“?id=” tuple of which media was search and which was recommended</a:t>
+            </a:r>
+            <a:endParaRPr sz="1500"/>
+          </a:p>
+          <a:p>
+            <a:pPr indent="-302418" lvl="1" marL="914400" rtl="0" algn="l">
+              <a:spcBef>
+                <a:spcPts val="0"/>
+              </a:spcBef>
+              <a:spcAft>
+                <a:spcPts val="0"/>
+              </a:spcAft>
+              <a:buSzPct val="100000"/>
+              <a:buChar char="-"/>
+            </a:pPr>
+            <a:r>
+              <a:rPr lang="en" sz="1500"/>
+              <a:t>GET</a:t>
+            </a:r>
+            <a:endParaRPr sz="1500"/>
+          </a:p>
+          <a:p>
+            <a:pPr indent="-302418" lvl="2" marL="1371600" rtl="0" algn="l">
+              <a:spcBef>
+                <a:spcPts val="0"/>
+              </a:spcBef>
+              <a:spcAft>
+                <a:spcPts val="0"/>
+              </a:spcAft>
+              <a:buSzPct val="100000"/>
+              <a:buChar char="-"/>
+            </a:pPr>
+            <a:r>
+              <a:rPr lang="en" sz="1500"/>
+              <a:t>“?id=” returns associative array of related media and count of “likes”</a:t>
+            </a:r>
+            <a:endParaRPr sz="1500"/>
+          </a:p>
+          <a:p>
+            <a:pPr indent="-302418" lvl="1" marL="914400" rtl="0" algn="l">
+              <a:spcBef>
+                <a:spcPts val="0"/>
+              </a:spcBef>
+              <a:spcAft>
+                <a:spcPts val="0"/>
+              </a:spcAft>
+              <a:buSzPct val="100000"/>
+              <a:buChar char="-"/>
+            </a:pPr>
+            <a:r>
+              <a:rPr lang="en" sz="1500"/>
+              <a:t>DELETE</a:t>
+            </a:r>
+            <a:endParaRPr sz="1500"/>
+          </a:p>
+          <a:p>
+            <a:pPr indent="-302418" lvl="2" marL="1371600" rtl="0" algn="l">
+              <a:spcBef>
+                <a:spcPts val="0"/>
+              </a:spcBef>
+              <a:spcAft>
+                <a:spcPts val="0"/>
+              </a:spcAft>
+              <a:buSzPct val="100000"/>
+              <a:buChar char="-"/>
+            </a:pPr>
+            <a:r>
+              <a:rPr lang="en" sz="1500"/>
+              <a:t>“?uid=” the user that wants to remove their like</a:t>
+            </a:r>
+            <a:endParaRPr sz="1500"/>
+          </a:p>
+          <a:p>
+            <a:pPr indent="-302418" lvl="2" marL="1371600" rtl="0" algn="l">
+              <a:spcBef>
+                <a:spcPts val="0"/>
+              </a:spcBef>
+              <a:spcAft>
+                <a:spcPts val="0"/>
+              </a:spcAft>
+              <a:buSzPct val="100000"/>
+              <a:buChar char="-"/>
+            </a:pPr>
+            <a:r>
+              <a:rPr lang="en" sz="1500"/>
+              <a:t>“?id=” the tuple which the user is trying to remove their like from</a:t>
+            </a:r>
+            <a:endParaRPr sz="1500"/>
+          </a:p>
+          <a:p>
+            <a:pPr indent="-302418" lvl="0" marL="457200" rtl="0" algn="l">
+              <a:spcBef>
+                <a:spcPts val="0"/>
+              </a:spcBef>
+              <a:spcAft>
+                <a:spcPts val="0"/>
+              </a:spcAft>
+              <a:buSzPct val="100000"/>
+              <a:buChar char="-"/>
+            </a:pPr>
+            <a:r>
+              <a:rPr lang="en" sz="1500"/>
+              <a:t>“/saved” endpoint</a:t>
+            </a:r>
+            <a:endParaRPr sz="1500"/>
+          </a:p>
+          <a:p>
+            <a:pPr indent="-302418" lvl="1" marL="914400" rtl="0" algn="l">
+              <a:spcBef>
+                <a:spcPts val="0"/>
+              </a:spcBef>
+              <a:spcAft>
+                <a:spcPts val="0"/>
+              </a:spcAft>
+              <a:buSzPct val="100000"/>
+              <a:buChar char="-"/>
+            </a:pPr>
+            <a:r>
+              <a:rPr lang="en" sz="1500"/>
+              <a:t>PUT</a:t>
+            </a:r>
+            <a:endParaRPr sz="1500"/>
+          </a:p>
+          <a:p>
+            <a:pPr indent="-302418" lvl="2" marL="1371600" rtl="0" algn="l">
+              <a:spcBef>
+                <a:spcPts val="0"/>
+              </a:spcBef>
+              <a:spcAft>
+                <a:spcPts val="0"/>
+              </a:spcAft>
+              <a:buSzPct val="100000"/>
+              <a:buChar char="-"/>
+            </a:pPr>
+            <a:r>
+              <a:rPr lang="en" sz="1500"/>
+              <a:t>“?uid=” the user that saved the media</a:t>
+            </a:r>
+            <a:endParaRPr sz="1500"/>
+          </a:p>
+          <a:p>
+            <a:pPr indent="-302418" lvl="2" marL="1371600" rtl="0" algn="l">
+              <a:spcBef>
+                <a:spcPts val="0"/>
+              </a:spcBef>
+              <a:spcAft>
+                <a:spcPts val="0"/>
+              </a:spcAft>
+              <a:buSzPct val="100000"/>
+              <a:buChar char="-"/>
+            </a:pPr>
+            <a:r>
+              <a:rPr lang="en" sz="1500"/>
+              <a:t>“?id=” the media that was saved</a:t>
+            </a:r>
+            <a:endParaRPr sz="1500"/>
+          </a:p>
+          <a:p>
+            <a:pPr indent="-302418" lvl="1" marL="914400" rtl="0" algn="l">
+              <a:spcBef>
+                <a:spcPts val="0"/>
+              </a:spcBef>
+              <a:spcAft>
+                <a:spcPts val="0"/>
+              </a:spcAft>
+              <a:buSzPct val="100000"/>
+              <a:buChar char="-"/>
+            </a:pPr>
+            <a:r>
+              <a:rPr lang="en" sz="1500"/>
+              <a:t>GET</a:t>
+            </a:r>
+            <a:endParaRPr sz="1500"/>
+          </a:p>
+          <a:p>
+            <a:pPr indent="-302418" lvl="2" marL="1371600" rtl="0" algn="l">
+              <a:spcBef>
+                <a:spcPts val="0"/>
+              </a:spcBef>
+              <a:spcAft>
+                <a:spcPts val="0"/>
+              </a:spcAft>
+              <a:buSzPct val="100000"/>
+              <a:buChar char="-"/>
+            </a:pPr>
+            <a:r>
+              <a:rPr lang="en" sz="1500"/>
+              <a:t>“?uid=” the user who’s saved media should be queried</a:t>
+            </a:r>
+            <a:endParaRPr sz="1500"/>
+          </a:p>
+          <a:p>
+            <a:pPr indent="-302418" lvl="1" marL="914400" rtl="0" algn="l">
+              <a:spcBef>
+                <a:spcPts val="0"/>
+              </a:spcBef>
+              <a:spcAft>
+                <a:spcPts val="0"/>
+              </a:spcAft>
+              <a:buSzPct val="100000"/>
+              <a:buChar char="-"/>
+            </a:pPr>
+            <a:r>
+              <a:rPr lang="en" sz="1500"/>
+              <a:t>DELETE</a:t>
+            </a:r>
+            <a:endParaRPr sz="1500"/>
+          </a:p>
+          <a:p>
+            <a:pPr indent="-302418" lvl="2" marL="1371600" rtl="0" algn="l">
+              <a:spcBef>
+                <a:spcPts val="0"/>
+              </a:spcBef>
+              <a:spcAft>
+                <a:spcPts val="0"/>
+              </a:spcAft>
+              <a:buSzPct val="100000"/>
+              <a:buChar char="-"/>
+            </a:pPr>
+            <a:r>
+              <a:rPr lang="en" sz="1500"/>
+              <a:t>“?uid=” the user who is trying to un-save a media</a:t>
+            </a:r>
+            <a:endParaRPr sz="1500"/>
+          </a:p>
+          <a:p>
+            <a:pPr indent="-302418" lvl="2" marL="1371600" rtl="0" algn="l">
+              <a:spcBef>
+                <a:spcPts val="0"/>
+              </a:spcBef>
+              <a:spcAft>
+                <a:spcPts val="0"/>
+              </a:spcAft>
+              <a:buSzPct val="100000"/>
+              <a:buChar char="-"/>
+            </a:pPr>
+            <a:r>
+              <a:rPr lang="en" sz="1500"/>
+              <a:t>“?id=” the media that the user is trying to remove</a:t>
+            </a:r>
+            <a:endParaRPr sz="1500"/>
+          </a:p>
+        </p:txBody>
+      </p:sp>
+    </p:spTree>
+  </p:cSld>
+  <p:clrMapOvr>
+    <a:masterClrMapping/>
+  </p:clrMapOvr>
+</p:sld>
+</file>
+
+<file path=ppt/slides/slide8.xml><?xml version="1.0" encoding="utf-8"?>
+<p:sld xmlns:a="http://schemas.openxmlformats.org/drawingml/2006/main" xmlns:r="http://schemas.openxmlformats.org/officeDocument/2006/relationships" xmlns:mc="http://schemas.openxmlformats.org/markup-compatibility/2006" xmlns:mv="urn:schemas-microsoft-com:mac:vml" xmlns:p="http://schemas.openxmlformats.org/presentationml/2006/main" xmlns:c="http://schemas.openxmlformats.org/drawingml/2006/chart" xmlns:dgm="http://schemas.openxmlformats.org/drawingml/2006/diagram" xmlns:o="urn:schemas-microsoft-com:office:office" xmlns:v="urn:schemas-microsoft-com:vml" xmlns:pvml="urn:schemas-microsoft-com:office:powerpoint" xmlns:com="http://schemas.openxmlformats.org/drawingml/2006/compatibility" xmlns:p14="http://schemas.microsoft.com/office/powerpoint/2010/main" xmlns:p15="http://schemas.microsoft.com/office/powerpoint/2012/main" xmlns:ahyp="http://schemas.microsoft.com/office/drawing/2018/hyperlinkcolor">
+  <p:cSld>
+    <p:spTree>
+      <p:nvGrpSpPr>
+        <p:cNvPr id="130" name="Shape 130"/>
+        <p:cNvGrpSpPr/>
+        <p:nvPr/>
+      </p:nvGrpSpPr>
+      <p:grpSpPr>
+        <a:xfrm>
+          <a:off x="0" y="0"/>
+          <a:ext cx="0" cy="0"/>
+          <a:chOff x="0" y="0"/>
+          <a:chExt cx="0" cy="0"/>
+        </a:xfrm>
+      </p:grpSpPr>
+      <p:sp>
+        <p:nvSpPr>
+          <p:cNvPr id="131" name="Google Shape;131;p20"/>
+          <p:cNvSpPr txBox="1"/>
+          <p:nvPr>
+            <p:ph type="title"/>
+          </p:nvPr>
+        </p:nvSpPr>
+        <p:spPr>
+          <a:xfrm>
+            <a:off x="311700" y="445025"/>
+            <a:ext cx="8520600" cy="572700"/>
+          </a:xfrm>
+          <a:prstGeom prst="rect">
+            <a:avLst/>
+          </a:prstGeom>
+        </p:spPr>
+        <p:txBody>
+          <a:bodyPr anchorCtr="0" anchor="t" bIns="91425" lIns="91425" spcFirstLastPara="1" rIns="91425" wrap="square" tIns="91425">
+            <a:normAutofit fontScale="90000"/>
+          </a:bodyPr>
+          <a:lstStyle/>
+          <a:p>
+            <a:pPr indent="0" lvl="0" marL="0" rtl="0" algn="l">
+              <a:spcBef>
+                <a:spcPts val="0"/>
+              </a:spcBef>
+              <a:spcAft>
+                <a:spcPts val="0"/>
+              </a:spcAft>
+              <a:buNone/>
+            </a:pPr>
+            <a:r>
+              <a:rPr lang="en"/>
+              <a:t>Optional Requirements</a:t>
+            </a:r>
+            <a:endParaRPr/>
+          </a:p>
+        </p:txBody>
+      </p:sp>
+      <p:sp>
+        <p:nvSpPr>
+          <p:cNvPr id="132" name="Google Shape;132;p20"/>
           <p:cNvSpPr txBox="1"/>
           <p:nvPr>
             <p:ph idx="1" type="body"/>
@@ -8721,107 +10249,53 @@
           </a:bodyPr>
           <a:lstStyle/>
           <a:p>
-            <a:pPr indent="0" lvl="0" marL="0" rtl="0" algn="l">
-              <a:spcBef>
-                <a:spcPts val="0"/>
-              </a:spcBef>
-              <a:spcAft>
-                <a:spcPts val="0"/>
-              </a:spcAft>
-              <a:buNone/>
+            <a:pPr indent="-342900" lvl="0" marL="457200" rtl="0" algn="l">
+              <a:spcBef>
+                <a:spcPts val="0"/>
+              </a:spcBef>
+              <a:spcAft>
+                <a:spcPts val="0"/>
+              </a:spcAft>
+              <a:buSzPts val="1800"/>
+              <a:buChar char="●"/>
             </a:pPr>
             <a:r>
               <a:rPr lang="en"/>
-              <a:t>Provides JSON response to GET queries about specific searches and media</a:t>
+              <a:t>Continuous web crawling</a:t>
             </a:r>
             <a:endParaRPr/>
           </a:p>
           <a:p>
             <a:pPr indent="-342900" lvl="0" marL="457200" rtl="0" algn="l">
               <a:spcBef>
-                <a:spcPts val="1200"/>
+                <a:spcPts val="0"/>
               </a:spcBef>
               <a:spcAft>
                 <a:spcPts val="0"/>
               </a:spcAft>
               <a:buSzPts val="1800"/>
-              <a:buChar char="-"/>
+              <a:buChar char="●"/>
             </a:pPr>
             <a:r>
               <a:rPr lang="en"/>
-              <a:t>“/search” endpoint</a:t>
+              <a:t>Metadata about piece of media</a:t>
             </a:r>
             <a:endParaRPr/>
           </a:p>
           <a:p>
-            <a:pPr indent="-317500" lvl="1" marL="914400" rtl="0" algn="l">
-              <a:spcBef>
-                <a:spcPts val="0"/>
-              </a:spcBef>
-              <a:spcAft>
-                <a:spcPts val="0"/>
-              </a:spcAft>
-              <a:buSzPts val="1400"/>
-              <a:buChar char="-"/>
+            <a:pPr indent="-342900" lvl="0" marL="457200" rtl="0" algn="l">
+              <a:spcBef>
+                <a:spcPts val="0"/>
+              </a:spcBef>
+              <a:spcAft>
+                <a:spcPts val="0"/>
+              </a:spcAft>
+              <a:buSzPts val="1800"/>
+              <a:buChar char="●"/>
             </a:pPr>
             <a:r>
               <a:rPr lang="en"/>
-              <a:t>“?title=” returns results of media which case-insensitive </a:t>
-            </a:r>
-            <a:r>
-              <a:rPr lang="en"/>
-              <a:t>wildcard match the provided string</a:t>
-            </a:r>
-            <a:endParaRPr/>
-          </a:p>
-          <a:p>
-            <a:pPr indent="-317500" lvl="1" marL="914400" rtl="0" algn="l">
-              <a:spcBef>
-                <a:spcPts val="0"/>
-              </a:spcBef>
-              <a:spcAft>
-                <a:spcPts val="0"/>
-              </a:spcAft>
-              <a:buSzPts val="1400"/>
-              <a:buChar char="-"/>
-            </a:pPr>
-            <a:r>
-              <a:rPr lang="en"/>
-              <a:t>“?filters=” comma separated list of trope filters, which queries for the intersection of media associated with those tropes</a:t>
-            </a:r>
-            <a:endParaRPr/>
-          </a:p>
-          <a:p>
-            <a:pPr indent="-342900" lvl="0" marL="457200" rtl="0" algn="l">
-              <a:spcBef>
-                <a:spcPts val="0"/>
-              </a:spcBef>
-              <a:spcAft>
-                <a:spcPts val="0"/>
-              </a:spcAft>
-              <a:buSzPts val="1800"/>
-              <a:buChar char="-"/>
-            </a:pPr>
-            <a:r>
-              <a:rPr lang="en"/>
-              <a:t>“/recommendation” endpoint</a:t>
-            </a:r>
-            <a:endParaRPr/>
-          </a:p>
-          <a:p>
-            <a:pPr indent="-317500" lvl="1" marL="914400" rtl="0" algn="l">
-              <a:spcBef>
-                <a:spcPts val="0"/>
-              </a:spcBef>
-              <a:spcAft>
-                <a:spcPts val="0"/>
-              </a:spcAft>
-              <a:buSzPts val="1400"/>
-              <a:buChar char="-"/>
-            </a:pPr>
-            <a:r>
-              <a:rPr lang="en"/>
-              <a:t>“?id=” the unique key for the media record the user is querying</a:t>
+              <a:t>Paging system for server endpoints</a:t>
             </a:r>
             <a:endParaRPr/>
           </a:p>
@@ -8835,12 +10309,12 @@
 </p:sld>
 </file>
 
-<file path=ppt/slides/slide6.xml><?xml version="1.0" encoding="utf-8"?>
+<file path=ppt/slides/slide9.xml><?xml version="1.0" encoding="utf-8"?>
 <p:sld xmlns:a="http://schemas.openxmlformats.org/drawingml/2006/main" xmlns:r="http://schemas.openxmlformats.org/officeDocument/2006/relationships" xmlns:mc="http://schemas.openxmlformats.org/markup-compatibility/2006" xmlns:mv="urn:schemas-microsoft-com:mac:vml" xmlns:p="http://schemas.openxmlformats.org/presentationml/2006/main" xmlns:c="http://schemas.openxmlformats.org/drawingml/2006/chart" xmlns:dgm="http://schemas.openxmlformats.org/drawingml/2006/diagram" xmlns:o="urn:schemas-microsoft-com:office:office" xmlns:v="urn:schemas-microsoft-com:vml" xmlns:pvml="urn:schemas-microsoft-com:office:powerpoint" xmlns:com="http://schemas.openxmlformats.org/drawingml/2006/compatibility" xmlns:p14="http://schemas.microsoft.com/office/powerpoint/2010/main" xmlns:p15="http://schemas.microsoft.com/office/powerpoint/2012/main" xmlns:ahyp="http://schemas.microsoft.com/office/drawing/2018/hyperlinkcolor">
   <p:cSld>
     <p:spTree>
       <p:nvGrpSpPr>
-        <p:cNvPr id="109" name="Shape 109"/>
+        <p:cNvPr id="136" name="Shape 136"/>
         <p:cNvGrpSpPr/>
         <p:nvPr/>
       </p:nvGrpSpPr>
@@ -8854,7 +10328,7 @@
       </p:grpSpPr>
       <p:sp>
         <p:nvSpPr>
-          <p:cNvPr id="110" name="Google Shape;110;p18"/>
+          <p:cNvPr id="137" name="Google Shape;137;p21"/>
           <p:cNvSpPr txBox="1"/>
           <p:nvPr>
             <p:ph type="title"/>
@@ -8886,203 +10360,7 @@
             </a:pPr>
             <a:r>
               <a:rPr lang="en"/>
-              <a:t>Optional Requirements</a:t>
-            </a:r>
-            <a:endParaRPr/>
-          </a:p>
-        </p:txBody>
-      </p:sp>
-      <p:sp>
-        <p:nvSpPr>
-          <p:cNvPr id="111" name="Google Shape;111;p18"/>
-          <p:cNvSpPr txBox="1"/>
-          <p:nvPr>
-            <p:ph idx="1" type="body"/>
-          </p:nvPr>
-        </p:nvSpPr>
-        <p:spPr>
-          <a:xfrm>
-            <a:off x="311700" y="1152475"/>
-            <a:ext cx="8520600" cy="3416400"/>
-          </a:xfrm>
-          <a:prstGeom prst="rect">
-            <a:avLst/>
-          </a:prstGeom>
-        </p:spPr>
-        <p:txBody>
-          <a:bodyPr anchorCtr="0" anchor="t" bIns="91425" lIns="91425" spcFirstLastPara="1" rIns="91425" wrap="square" tIns="91425">
-            <a:normAutofit/>
-          </a:bodyPr>
-          <a:lstStyle/>
-          <a:p>
-            <a:pPr indent="-342900" lvl="0" marL="457200" rtl="0" algn="l">
-              <a:spcBef>
-                <a:spcPts val="0"/>
-              </a:spcBef>
-              <a:spcAft>
-                <a:spcPts val="0"/>
-              </a:spcAft>
-              <a:buSzPts val="1800"/>
-              <a:buChar char="●"/>
-            </a:pPr>
-            <a:r>
-              <a:rPr lang="en"/>
-              <a:t>Continuous web crawling</a:t>
-            </a:r>
-            <a:endParaRPr/>
-          </a:p>
-          <a:p>
-            <a:pPr indent="-342900" lvl="0" marL="457200" rtl="0" algn="l">
-              <a:spcBef>
-                <a:spcPts val="0"/>
-              </a:spcBef>
-              <a:spcAft>
-                <a:spcPts val="0"/>
-              </a:spcAft>
-              <a:buSzPts val="1800"/>
-              <a:buChar char="●"/>
-            </a:pPr>
-            <a:r>
-              <a:rPr lang="en"/>
-              <a:t>Metadata about piece of media</a:t>
-            </a:r>
-            <a:endParaRPr/>
-          </a:p>
-          <a:p>
-            <a:pPr indent="-342900" lvl="0" marL="457200" rtl="0" algn="l">
-              <a:spcBef>
-                <a:spcPts val="0"/>
-              </a:spcBef>
-              <a:spcAft>
-                <a:spcPts val="0"/>
-              </a:spcAft>
-              <a:buSzPts val="1800"/>
-              <a:buChar char="●"/>
-            </a:pPr>
-            <a:r>
-              <a:rPr lang="en"/>
-              <a:t>User accounts </a:t>
-            </a:r>
-            <a:endParaRPr/>
-          </a:p>
-          <a:p>
-            <a:pPr indent="-342900" lvl="0" marL="457200" rtl="0" algn="l">
-              <a:spcBef>
-                <a:spcPts val="0"/>
-              </a:spcBef>
-              <a:spcAft>
-                <a:spcPts val="0"/>
-              </a:spcAft>
-              <a:buSzPts val="1800"/>
-              <a:buChar char="●"/>
-            </a:pPr>
-            <a:r>
-              <a:rPr lang="en"/>
-              <a:t>Paging system for server endpoints</a:t>
-            </a:r>
-            <a:endParaRPr/>
-          </a:p>
-        </p:txBody>
-      </p:sp>
-    </p:spTree>
-  </p:cSld>
-  <p:clrMapOvr>
-    <a:masterClrMapping/>
-  </p:clrMapOvr>
-</p:sld>
-</file>
-
-<file path=ppt/slides/slide7.xml><?xml version="1.0" encoding="utf-8"?>
-<p:sld xmlns:a="http://schemas.openxmlformats.org/drawingml/2006/main" xmlns:r="http://schemas.openxmlformats.org/officeDocument/2006/relationships" xmlns:mc="http://schemas.openxmlformats.org/markup-compatibility/2006" xmlns:mv="urn:schemas-microsoft-com:mac:vml" xmlns:p="http://schemas.openxmlformats.org/presentationml/2006/main" xmlns:c="http://schemas.openxmlformats.org/drawingml/2006/chart" xmlns:dgm="http://schemas.openxmlformats.org/drawingml/2006/diagram" xmlns:o="urn:schemas-microsoft-com:office:office" xmlns:v="urn:schemas-microsoft-com:vml" xmlns:pvml="urn:schemas-microsoft-com:office:powerpoint" xmlns:com="http://schemas.openxmlformats.org/drawingml/2006/compatibility" xmlns:p14="http://schemas.microsoft.com/office/powerpoint/2010/main" xmlns:p15="http://schemas.microsoft.com/office/powerpoint/2012/main" xmlns:ahyp="http://schemas.microsoft.com/office/drawing/2018/hyperlinkcolor">
-  <p:cSld>
-    <p:spTree>
-      <p:nvGrpSpPr>
-        <p:cNvPr id="115" name="Shape 115"/>
-        <p:cNvGrpSpPr/>
-        <p:nvPr/>
-      </p:nvGrpSpPr>
-      <p:grpSpPr>
-        <a:xfrm>
-          <a:off x="0" y="0"/>
-          <a:ext cx="0" cy="0"/>
-          <a:chOff x="0" y="0"/>
-          <a:chExt cx="0" cy="0"/>
-        </a:xfrm>
-      </p:grpSpPr>
-      <p:sp>
-        <p:nvSpPr>
-          <p:cNvPr id="116" name="Google Shape;116;p19"/>
-          <p:cNvSpPr txBox="1"/>
-          <p:nvPr>
-            <p:ph type="title"/>
-          </p:nvPr>
-        </p:nvSpPr>
-        <p:spPr>
-          <a:xfrm>
-            <a:off x="311700" y="445025"/>
-            <a:ext cx="8520600" cy="572700"/>
-          </a:xfrm>
-          <a:prstGeom prst="rect">
-            <a:avLst/>
-          </a:prstGeom>
-        </p:spPr>
-        <p:txBody>
-          <a:bodyPr anchorCtr="0" anchor="t" bIns="91425" lIns="91425" spcFirstLastPara="1" rIns="91425" wrap="square" tIns="91425">
-            <a:normAutofit fontScale="90000"/>
-          </a:bodyPr>
-          <a:lstStyle/>
-          <a:p>
-            <a:pPr indent="0" lvl="0" marL="0" rtl="0" algn="l">
-              <a:spcBef>
-                <a:spcPts val="0"/>
-              </a:spcBef>
-              <a:spcAft>
-                <a:spcPts val="0"/>
-              </a:spcAft>
-              <a:buNone/>
-            </a:pPr>
-            <a:r>
-              <a:rPr lang="en"/>
               <a:t>The Diagram</a:t>
-            </a:r>
-            <a:endParaRPr/>
-          </a:p>
-        </p:txBody>
-      </p:sp>
-      <p:sp>
-        <p:nvSpPr>
-          <p:cNvPr id="117" name="Google Shape;117;p19"/>
-          <p:cNvSpPr txBox="1"/>
-          <p:nvPr>
-            <p:ph idx="1" type="body"/>
-          </p:nvPr>
-        </p:nvSpPr>
-        <p:spPr>
-          <a:xfrm>
-            <a:off x="311700" y="1152475"/>
-            <a:ext cx="8520600" cy="3416400"/>
-          </a:xfrm>
-          <a:prstGeom prst="rect">
-            <a:avLst/>
-          </a:prstGeom>
-        </p:spPr>
-        <p:txBody>
-          <a:bodyPr anchorCtr="0" anchor="t" bIns="91425" lIns="91425" spcFirstLastPara="1" rIns="91425" wrap="square" tIns="91425">
-            <a:normAutofit/>
-          </a:bodyPr>
-          <a:lstStyle/>
-          <a:p>
-            <a:pPr indent="0" lvl="0" marL="0" rtl="0" algn="l">
-              <a:spcBef>
-                <a:spcPts val="0"/>
-              </a:spcBef>
-              <a:spcAft>
-                <a:spcPts val="1200"/>
-              </a:spcAft>
-              <a:buNone/>
-            </a:pPr>
-            <a:r>
-              <a:t/>
             </a:r>
             <a:endParaRPr/>
           </a:p>
@@ -9090,7 +10368,7 @@
       </p:sp>
       <p:pic>
         <p:nvPicPr>
-          <p:cNvPr id="118" name="Google Shape;118;p19"/>
+          <p:cNvPr id="138" name="Google Shape;138;p21"/>
           <p:cNvPicPr preferRelativeResize="0"/>
           <p:nvPr/>
         </p:nvPicPr>

</xml_diff>